<commit_message>
updated on August 22
</commit_message>
<xml_diff>
--- a/Notes/Chapter6/Chapter6.pptx
+++ b/Notes/Chapter6/Chapter6.pptx
@@ -8942,11 +8942,7 @@
             </a:br>
             <a:r>
               <a:rPr lang="en-US" altLang="zh-CN" dirty="0" smtClean="0"/>
-              <a:t>Inference </a:t>
-            </a:r>
-            <a:r>
-              <a:rPr lang="en-US" altLang="zh-CN" dirty="0" smtClean="0"/>
-              <a:t>for Categorical Data</a:t>
+              <a:t>Inference for Categorical Data</a:t>
             </a:r>
             <a:endParaRPr lang="en-US" altLang="en-US" dirty="0"/>
           </a:p>
@@ -9062,7 +9058,6 @@
               <a:rPr lang="en-US" altLang="en-US" dirty="0" smtClean="0"/>
               <a:t>it</a:t>
             </a:r>
-            <a:endParaRPr lang="en-US" altLang="en-US" dirty="0" smtClean="0"/>
           </a:p>
         </p:txBody>
       </p:sp>
@@ -9529,15 +9524,7 @@
           <a:p>
             <a:r>
               <a:rPr lang="en-US" altLang="en-US" dirty="0" smtClean="0"/>
-              <a:t>Testing for Goodness of </a:t>
-            </a:r>
-            <a:r>
-              <a:rPr lang="en-US" altLang="en-US" dirty="0" smtClean="0"/>
-              <a:t>F</a:t>
-            </a:r>
-            <a:r>
-              <a:rPr lang="en-US" altLang="en-US" dirty="0" smtClean="0"/>
-              <a:t>it (</a:t>
+              <a:t>Testing for Goodness of Fit (</a:t>
             </a:r>
             <a:r>
               <a:rPr lang="en-US" altLang="zh-CN" dirty="0" smtClean="0"/>
@@ -9887,11 +9874,7 @@
                       <a:pPr algn="ctr"/>
                       <a:r>
                         <a:rPr lang="en-US" dirty="0" smtClean="0"/>
-                        <a:t>275×</a:t>
-                      </a:r>
-                      <a:r>
-                        <a:rPr lang="en-US" dirty="0" smtClean="0"/>
-                        <a:t>0.07=19.25</a:t>
+                        <a:t>275×0.07=19.25</a:t>
                       </a:r>
                       <a:endParaRPr lang="en-US" dirty="0"/>
                     </a:p>
@@ -9906,11 +9889,7 @@
                       <a:pPr algn="ctr"/>
                       <a:r>
                         <a:rPr lang="en-US" dirty="0" smtClean="0"/>
-                        <a:t>275×</a:t>
-                      </a:r>
-                      <a:r>
-                        <a:rPr lang="en-US" dirty="0" smtClean="0"/>
-                        <a:t>0.12=33</a:t>
+                        <a:t>275×0.12=33</a:t>
                       </a:r>
                       <a:endParaRPr lang="en-US" dirty="0"/>
                     </a:p>
@@ -9925,11 +9904,7 @@
                       <a:pPr algn="ctr"/>
                       <a:r>
                         <a:rPr lang="en-US" dirty="0" smtClean="0"/>
-                        <a:t>275×</a:t>
-                      </a:r>
-                      <a:r>
-                        <a:rPr lang="en-US" dirty="0" smtClean="0"/>
-                        <a:t>0.09=24.75</a:t>
+                        <a:t>275×0.09=24.75</a:t>
                       </a:r>
                       <a:endParaRPr lang="en-US" dirty="0"/>
                     </a:p>
@@ -10017,12 +9992,11 @@
               <a:rPr lang="en-US" altLang="en-US" dirty="0" smtClean="0"/>
               <a:t>Chi-square Test</a:t>
             </a:r>
-            <a:endParaRPr lang="en-US" altLang="en-US" dirty="0" smtClean="0"/>
           </a:p>
         </p:txBody>
       </p:sp>
-      <mc:AlternateContent xmlns:mc="http://schemas.openxmlformats.org/markup-compatibility/2006">
-        <mc:Choice xmlns:a14="http://schemas.microsoft.com/office/drawing/2010/main" Requires="a14">
+      <mc:AlternateContent xmlns:mc="http://schemas.openxmlformats.org/markup-compatibility/2006" xmlns:a14="http://schemas.microsoft.com/office/drawing/2010/main">
+        <mc:Choice Requires="a14">
           <p:sp>
             <p:nvSpPr>
               <p:cNvPr id="19459" name="Rectangle 6"/>
@@ -10892,7 +10866,7 @@
             </p:txBody>
           </p:sp>
         </mc:Choice>
-        <mc:Fallback>
+        <mc:Fallback xmlns="">
           <p:sp>
             <p:nvSpPr>
               <p:cNvPr id="19459" name="Rectangle 6"/>
@@ -10982,7 +10956,6 @@
               <a:rPr lang="en-US" altLang="en-US" dirty="0" smtClean="0"/>
               <a:t>Chi-square Distribution</a:t>
             </a:r>
-            <a:endParaRPr lang="en-US" altLang="en-US" dirty="0" smtClean="0"/>
           </a:p>
         </p:txBody>
       </p:sp>
@@ -11079,11 +11052,7 @@
                 </a:pPr>
                 <a:r>
                   <a:rPr lang="en-US" altLang="zh-CN" dirty="0" smtClean="0"/>
-                  <a:t>The chi-square distribution</a:t>
-                </a:r>
-                <a:r>
-                  <a:rPr lang="en-US" altLang="zh-CN" dirty="0" smtClean="0"/>
-                  <a:t> is positive and right skewed with mean </a:t>
+                  <a:t>The chi-square distribution is positive and right skewed with mean </a:t>
                 </a:r>
                 <a:r>
                   <a:rPr lang="en-US" altLang="zh-CN" i="1" dirty="0" err="1">
@@ -11116,7 +11085,19 @@
                 </a:pPr>
                 <a:r>
                   <a:rPr lang="en-US" altLang="zh-CN" dirty="0" smtClean="0"/>
-                  <a:t>The larger the degree of freedom (</a:t>
+                  <a:t>The larger </a:t>
+                </a:r>
+                <a:r>
+                  <a:rPr lang="en-US" altLang="zh-CN" smtClean="0"/>
+                  <a:t>the </a:t>
+                </a:r>
+                <a:r>
+                  <a:rPr lang="en-US" altLang="zh-CN" smtClean="0"/>
+                  <a:t>degrees </a:t>
+                </a:r>
+                <a:r>
+                  <a:rPr lang="en-US" altLang="zh-CN" dirty="0" smtClean="0"/>
+                  <a:t>of freedom (</a:t>
                 </a:r>
                 <a:r>
                   <a:rPr lang="en-US" altLang="zh-CN" i="1" dirty="0" err="1" smtClean="0">
@@ -11129,7 +11110,6 @@
                   <a:rPr lang="en-US" altLang="zh-CN" dirty="0" smtClean="0"/>
                   <a:t>), the closer the distribution to a normal distribution. </a:t>
                 </a:r>
-                <a:endParaRPr lang="en-US" altLang="zh-CN" dirty="0" smtClean="0"/>
               </a:p>
               <a:p>
                 <a:pPr lvl="1"/>
@@ -11179,7 +11159,7 @@
               <a:blipFill>
                 <a:blip r:embed="rId3"/>
                 <a:stretch>
-                  <a:fillRect l="-1871" t="-2521" r="-2287"/>
+                  <a:fillRect l="-1871" t="-2521" r="-3015"/>
                 </a:stretch>
               </a:blipFill>
             </p:spPr>
@@ -11284,12 +11264,11 @@
               <a:rPr lang="en-US" altLang="en-US" dirty="0" smtClean="0"/>
               <a:t>Chi-square Test (cont’d)</a:t>
             </a:r>
-            <a:endParaRPr lang="en-US" altLang="en-US" dirty="0" smtClean="0"/>
           </a:p>
         </p:txBody>
       </p:sp>
-      <mc:AlternateContent xmlns:mc="http://schemas.openxmlformats.org/markup-compatibility/2006">
-        <mc:Choice xmlns:a14="http://schemas.microsoft.com/office/drawing/2010/main" Requires="a14">
+      <mc:AlternateContent xmlns:mc="http://schemas.openxmlformats.org/markup-compatibility/2006" xmlns:a14="http://schemas.microsoft.com/office/drawing/2010/main">
+        <mc:Choice Requires="a14">
           <p:sp>
             <p:nvSpPr>
               <p:cNvPr id="19459" name="Rectangle 6"/>
@@ -11620,7 +11599,6 @@
                   <a:rPr lang="en-US" altLang="en-US" dirty="0"/>
                   <a:t>.</a:t>
                 </a:r>
-                <a:endParaRPr lang="en-US" altLang="en-US" dirty="0"/>
               </a:p>
               <a:p>
                 <a:pPr lvl="1"/>
@@ -11706,7 +11684,6 @@
                   <a:rPr lang="en-US" altLang="en-US" dirty="0"/>
                   <a:t>.</a:t>
                 </a:r>
-                <a:endParaRPr lang="en-US" altLang="en-US" dirty="0"/>
               </a:p>
               <a:p>
                 <a:r>
@@ -11753,7 +11730,7 @@
             </p:txBody>
           </p:sp>
         </mc:Choice>
-        <mc:Fallback>
+        <mc:Fallback xmlns="">
           <p:sp>
             <p:nvSpPr>
               <p:cNvPr id="19459" name="Rectangle 6"/>
@@ -11877,7 +11854,6 @@
               <a:rPr lang="en-US" altLang="en-US" dirty="0" smtClean="0"/>
               <a:t>Chi-square Test (cont’d)</a:t>
             </a:r>
-            <a:endParaRPr lang="en-US" altLang="en-US" dirty="0" smtClean="0"/>
           </a:p>
         </p:txBody>
       </p:sp>
@@ -11988,7 +11964,6 @@
               <a:rPr lang="en-US" altLang="en-US" sz="2400" dirty="0" smtClean="0"/>
               <a:t>  = F) = 0.1171</a:t>
             </a:r>
-            <a:endParaRPr lang="en-US" altLang="en-US" sz="2400" dirty="0" smtClean="0"/>
           </a:p>
           <a:p>
             <a:endParaRPr lang="en-US" altLang="en-US" dirty="0"/>
@@ -12425,7 +12400,6 @@
               <a:rPr lang="en-US" altLang="en-US" dirty="0" smtClean="0"/>
               <a:t>Testing for Independence</a:t>
             </a:r>
-            <a:endParaRPr lang="en-US" altLang="en-US" dirty="0" smtClean="0"/>
           </a:p>
         </p:txBody>
       </p:sp>
@@ -12927,12 +12901,11 @@
               <a:rPr lang="en-US" altLang="en-US" dirty="0" smtClean="0"/>
               <a:t>Testing for Independence (cont’d)</a:t>
             </a:r>
-            <a:endParaRPr lang="en-US" altLang="en-US" dirty="0" smtClean="0"/>
           </a:p>
         </p:txBody>
       </p:sp>
-      <mc:AlternateContent xmlns:mc="http://schemas.openxmlformats.org/markup-compatibility/2006">
-        <mc:Choice xmlns:a14="http://schemas.microsoft.com/office/drawing/2010/main" Requires="a14">
+      <mc:AlternateContent xmlns:mc="http://schemas.openxmlformats.org/markup-compatibility/2006" xmlns:a14="http://schemas.microsoft.com/office/drawing/2010/main">
+        <mc:Choice Requires="a14">
           <p:sp>
             <p:nvSpPr>
               <p:cNvPr id="19459" name="Rectangle 6"/>
@@ -13145,7 +13118,7 @@
             </p:txBody>
           </p:sp>
         </mc:Choice>
-        <mc:Fallback>
+        <mc:Fallback xmlns="">
           <p:sp>
             <p:nvSpPr>
               <p:cNvPr id="19459" name="Rectangle 6"/>
@@ -13359,11 +13332,7 @@
                       <a:pPr algn="ctr"/>
                       <a:r>
                         <a:rPr lang="en-US" dirty="0" smtClean="0"/>
-                        <a:t>23 </a:t>
-                      </a:r>
-                      <a:r>
-                        <a:rPr lang="en-US" dirty="0" smtClean="0"/>
-                        <a:t>(73 × 61/219</a:t>
+                        <a:t>23 (73 × 61/219</a:t>
                       </a:r>
                       <a:r>
                         <a:rPr lang="en-US" baseline="0" dirty="0" smtClean="0"/>
@@ -13382,11 +13351,7 @@
                       <a:pPr algn="ctr"/>
                       <a:r>
                         <a:rPr lang="en-US" dirty="0" smtClean="0"/>
-                        <a:t>36 </a:t>
-                      </a:r>
-                      <a:r>
-                        <a:rPr lang="en-US" dirty="0" smtClean="0"/>
-                        <a:t>(73 × 61/219</a:t>
+                        <a:t>36 (73 × 61/219</a:t>
                       </a:r>
                       <a:r>
                         <a:rPr lang="en-US" baseline="0" dirty="0" smtClean="0"/>
@@ -13441,11 +13406,7 @@
                       <a:pPr algn="ctr"/>
                       <a:r>
                         <a:rPr lang="en-US" dirty="0" smtClean="0"/>
-                        <a:t>71 </a:t>
-                      </a:r>
-                      <a:r>
-                        <a:rPr lang="en-US" dirty="0" smtClean="0"/>
-                        <a:t>(73 × 158/219</a:t>
+                        <a:t>71 (73 × 158/219</a:t>
                       </a:r>
                       <a:r>
                         <a:rPr lang="en-US" baseline="0" dirty="0" smtClean="0"/>
@@ -13464,11 +13425,7 @@
                       <a:pPr algn="ctr"/>
                       <a:r>
                         <a:rPr lang="en-US" dirty="0" smtClean="0"/>
-                        <a:t>50 </a:t>
-                      </a:r>
-                      <a:r>
-                        <a:rPr lang="en-US" dirty="0" smtClean="0"/>
-                        <a:t>(73 × 158/219</a:t>
+                        <a:t>50 (73 × 158/219</a:t>
                       </a:r>
                       <a:r>
                         <a:rPr lang="en-US" baseline="0" dirty="0" smtClean="0"/>
@@ -13487,11 +13444,7 @@
                       <a:pPr algn="ctr"/>
                       <a:r>
                         <a:rPr lang="en-US" dirty="0" smtClean="0"/>
-                        <a:t>37 </a:t>
-                      </a:r>
-                      <a:r>
-                        <a:rPr lang="en-US" dirty="0" smtClean="0"/>
-                        <a:t>(73 × 158/219</a:t>
+                        <a:t>37 (73 × 158/219</a:t>
                       </a:r>
                       <a:r>
                         <a:rPr lang="en-US" baseline="0" dirty="0" smtClean="0"/>
@@ -13664,12 +13617,11 @@
               <a:rPr lang="en-US" altLang="en-US" dirty="0" smtClean="0"/>
               <a:t>Chi-square Test</a:t>
             </a:r>
-            <a:endParaRPr lang="en-US" altLang="en-US" dirty="0" smtClean="0"/>
           </a:p>
         </p:txBody>
       </p:sp>
-      <mc:AlternateContent xmlns:mc="http://schemas.openxmlformats.org/markup-compatibility/2006">
-        <mc:Choice xmlns:a14="http://schemas.microsoft.com/office/drawing/2010/main" Requires="a14">
+      <mc:AlternateContent xmlns:mc="http://schemas.openxmlformats.org/markup-compatibility/2006" xmlns:a14="http://schemas.microsoft.com/office/drawing/2010/main">
+        <mc:Choice Requires="a14">
           <p:sp>
             <p:nvSpPr>
               <p:cNvPr id="19459" name="Rectangle 6"/>
@@ -14569,7 +14521,7 @@
             </p:txBody>
           </p:sp>
         </mc:Choice>
-        <mc:Fallback>
+        <mc:Fallback xmlns="">
           <p:sp>
             <p:nvSpPr>
               <p:cNvPr id="19459" name="Rectangle 6"/>
@@ -14662,8 +14614,8 @@
           </a:p>
         </p:txBody>
       </p:sp>
-      <mc:AlternateContent xmlns:mc="http://schemas.openxmlformats.org/markup-compatibility/2006">
-        <mc:Choice xmlns:a14="http://schemas.microsoft.com/office/drawing/2010/main" Requires="a14">
+      <mc:AlternateContent xmlns:mc="http://schemas.openxmlformats.org/markup-compatibility/2006" xmlns:a14="http://schemas.microsoft.com/office/drawing/2010/main">
+        <mc:Choice Requires="a14">
           <p:sp>
             <p:nvSpPr>
               <p:cNvPr id="19459" name="Rectangle 6"/>
@@ -14725,13 +14677,7 @@
                         <a:rPr lang="en-US" altLang="en-US" b="0" i="1" smtClean="0">
                           <a:latin typeface="Cambria Math" panose="02040503050406030204" pitchFamily="18" charset="0"/>
                         </a:rPr>
-                        <m:t>:</m:t>
-                      </m:r>
-                      <m:r>
-                        <a:rPr lang="en-US" altLang="en-US" b="0" i="1" smtClean="0">
-                          <a:latin typeface="Cambria Math" panose="02040503050406030204" pitchFamily="18" charset="0"/>
-                        </a:rPr>
-                        <m:t> </m:t>
+                        <m:t>: </m:t>
                       </m:r>
                       <m:r>
                         <a:rPr lang="en-US" altLang="en-US" b="0" i="1" smtClean="0">
@@ -15330,7 +15276,7 @@
             </p:txBody>
           </p:sp>
         </mc:Choice>
-        <mc:Fallback>
+        <mc:Fallback xmlns="">
           <p:sp>
             <p:nvSpPr>
               <p:cNvPr id="19459" name="Rectangle 6"/>
@@ -15420,12 +15366,11 @@
               <a:rPr lang="en-US" altLang="en-US" dirty="0" smtClean="0"/>
               <a:t>Chi-square Test (cont’d)</a:t>
             </a:r>
-            <a:endParaRPr lang="en-US" altLang="en-US" dirty="0" smtClean="0"/>
           </a:p>
         </p:txBody>
       </p:sp>
-      <mc:AlternateContent xmlns:mc="http://schemas.openxmlformats.org/markup-compatibility/2006">
-        <mc:Choice xmlns:a14="http://schemas.microsoft.com/office/drawing/2010/main" Requires="a14">
+      <mc:AlternateContent xmlns:mc="http://schemas.openxmlformats.org/markup-compatibility/2006" xmlns:a14="http://schemas.microsoft.com/office/drawing/2010/main">
+        <mc:Choice Requires="a14">
           <p:sp>
             <p:nvSpPr>
               <p:cNvPr id="19459" name="Rectangle 6"/>
@@ -15783,7 +15728,6 @@
                   <a:rPr lang="en-US" altLang="en-US" dirty="0"/>
                   <a:t>.</a:t>
                 </a:r>
-                <a:endParaRPr lang="en-US" altLang="en-US" dirty="0"/>
               </a:p>
               <a:p>
                 <a:pPr lvl="1"/>
@@ -15869,7 +15813,6 @@
                   <a:rPr lang="en-US" altLang="en-US" dirty="0"/>
                   <a:t>.</a:t>
                 </a:r>
-                <a:endParaRPr lang="en-US" altLang="en-US" dirty="0"/>
               </a:p>
               <a:p>
                 <a:r>
@@ -15955,7 +15898,7 @@
             </p:txBody>
           </p:sp>
         </mc:Choice>
-        <mc:Fallback>
+        <mc:Fallback xmlns="">
           <p:sp>
             <p:nvSpPr>
               <p:cNvPr id="19459" name="Rectangle 6"/>
@@ -16074,11 +16017,7 @@
             </a:pPr>
             <a:r>
               <a:rPr lang="en-US" altLang="en-US" sz="2400" dirty="0" smtClean="0"/>
-              <a:t>In a nationwide telephone poll of 1000 adults representing Democrats, Republicans, and Independents, respondents were asked two questions: their party affiliation and if their confidence in the U.S. banking system had been shaken by the savings and loan crisis. Is there significant evidence that shaken confidence in the banking system is independent of party affiliation? Use a 10% significance leve</a:t>
-            </a:r>
-            <a:r>
-              <a:rPr lang="en-US" altLang="en-US" sz="2400" dirty="0" smtClean="0"/>
-              <a:t>l.</a:t>
+              <a:t>In a nationwide telephone poll of 1000 adults representing Democrats, Republicans, and Independents, respondents were asked two questions: their party affiliation and if their confidence in the U.S. banking system had been shaken by the savings and loan crisis. Is there significant evidence that shaken confidence in the banking system is independent of party affiliation? Use a 10% significance level.</a:t>
             </a:r>
             <a:endParaRPr lang="en-US" altLang="en-US" sz="2400" dirty="0"/>
           </a:p>
@@ -16470,12 +16409,11 @@
               <a:rPr lang="en-US" altLang="en-US" dirty="0" smtClean="0"/>
               <a:t>One-sided Hypothesis Test</a:t>
             </a:r>
-            <a:endParaRPr lang="en-US" altLang="en-US" dirty="0" smtClean="0"/>
           </a:p>
         </p:txBody>
       </p:sp>
-      <mc:AlternateContent xmlns:mc="http://schemas.openxmlformats.org/markup-compatibility/2006">
-        <mc:Choice xmlns:a14="http://schemas.microsoft.com/office/drawing/2010/main" Requires="a14">
+      <mc:AlternateContent xmlns:mc="http://schemas.openxmlformats.org/markup-compatibility/2006" xmlns:a14="http://schemas.microsoft.com/office/drawing/2010/main">
+        <mc:Choice Requires="a14">
           <p:sp>
             <p:nvSpPr>
               <p:cNvPr id="19459" name="Rectangle 6"/>
@@ -16660,7 +16598,7 @@
             </p:txBody>
           </p:sp>
         </mc:Choice>
-        <mc:Fallback>
+        <mc:Fallback xmlns="">
           <p:sp>
             <p:nvSpPr>
               <p:cNvPr id="19459" name="Rectangle 6"/>
@@ -16758,12 +16696,11 @@
               <a:rPr lang="en-US" altLang="en-US" dirty="0" smtClean="0"/>
               <a:t>ize when Estimating a Proportion</a:t>
             </a:r>
-            <a:endParaRPr lang="en-US" altLang="en-US" dirty="0" smtClean="0"/>
           </a:p>
         </p:txBody>
       </p:sp>
-      <mc:AlternateContent xmlns:mc="http://schemas.openxmlformats.org/markup-compatibility/2006">
-        <mc:Choice xmlns:a14="http://schemas.microsoft.com/office/drawing/2010/main" Requires="a14">
+      <mc:AlternateContent xmlns:mc="http://schemas.openxmlformats.org/markup-compatibility/2006" xmlns:a14="http://schemas.microsoft.com/office/drawing/2010/main">
+        <mc:Choice Requires="a14">
           <p:sp>
             <p:nvSpPr>
               <p:cNvPr id="19459" name="Rectangle 6"/>
@@ -16783,15 +16720,7 @@
               <a:p>
                 <a:r>
                   <a:rPr lang="en-US" altLang="en-US" dirty="0"/>
-                  <a:t>Population </a:t>
-                </a:r>
-                <a:r>
-                  <a:rPr lang="en-US" altLang="en-US" dirty="0"/>
-                  <a:t>p</a:t>
-                </a:r>
-                <a:r>
-                  <a:rPr lang="en-US" altLang="en-US" dirty="0"/>
-                  <a:t>roportion</a:t>
+                  <a:t>Population proportion</a:t>
                 </a:r>
               </a:p>
               <a:p>
@@ -17113,7 +17042,6 @@
                   <a:rPr lang="en-US" altLang="en-US" dirty="0"/>
                   <a:t>]</a:t>
                 </a:r>
-                <a:endParaRPr lang="en-US" altLang="en-US" dirty="0"/>
               </a:p>
               <a:p>
                 <a:r>
@@ -17323,7 +17251,6 @@
                   <a:rPr lang="en-US" altLang="en-US" dirty="0" smtClean="0"/>
                   <a:t> = 0.5 (worst case).</a:t>
                 </a:r>
-                <a:endParaRPr lang="en-US" altLang="en-US" dirty="0" smtClean="0"/>
               </a:p>
               <a:p>
                 <a:endParaRPr lang="en-US" altLang="en-US" sz="4500" dirty="0"/>
@@ -17349,7 +17276,7 @@
             </p:txBody>
           </p:sp>
         </mc:Choice>
-        <mc:Fallback>
+        <mc:Fallback xmlns="">
           <p:sp>
             <p:nvSpPr>
               <p:cNvPr id="19459" name="Rectangle 6"/>
@@ -17439,12 +17366,11 @@
               <a:rPr lang="en-US" altLang="en-US" dirty="0" smtClean="0"/>
               <a:t>Difference of Two Proportions</a:t>
             </a:r>
-            <a:endParaRPr lang="en-US" altLang="en-US" dirty="0" smtClean="0"/>
           </a:p>
         </p:txBody>
       </p:sp>
-      <mc:AlternateContent xmlns:mc="http://schemas.openxmlformats.org/markup-compatibility/2006">
-        <mc:Choice xmlns:a14="http://schemas.microsoft.com/office/drawing/2010/main" Requires="a14">
+      <mc:AlternateContent xmlns:mc="http://schemas.openxmlformats.org/markup-compatibility/2006" xmlns:a14="http://schemas.microsoft.com/office/drawing/2010/main">
+        <mc:Choice Requires="a14">
           <p:sp>
             <p:nvSpPr>
               <p:cNvPr id="19459" name="Rectangle 6"/>
@@ -18097,7 +18023,6 @@
                   <a:rPr lang="en-US" altLang="en-US" dirty="0" smtClean="0"/>
                   <a:t>Success-failure condition: the condition holds for both groups</a:t>
                 </a:r>
-                <a:endParaRPr lang="en-US" altLang="en-US" dirty="0" smtClean="0"/>
               </a:p>
               <a:p>
                 <a:endParaRPr lang="en-US" altLang="en-US" dirty="0"/>
@@ -18111,7 +18036,7 @@
             </p:txBody>
           </p:sp>
         </mc:Choice>
-        <mc:Fallback>
+        <mc:Fallback xmlns="">
           <p:sp>
             <p:nvSpPr>
               <p:cNvPr id="19459" name="Rectangle 6"/>
@@ -18204,8 +18129,8 @@
           </a:p>
         </p:txBody>
       </p:sp>
-      <mc:AlternateContent xmlns:mc="http://schemas.openxmlformats.org/markup-compatibility/2006">
-        <mc:Choice xmlns:a14="http://schemas.microsoft.com/office/drawing/2010/main" Requires="a14">
+      <mc:AlternateContent xmlns:mc="http://schemas.openxmlformats.org/markup-compatibility/2006" xmlns:a14="http://schemas.microsoft.com/office/drawing/2010/main">
+        <mc:Choice Requires="a14">
           <p:sp>
             <p:nvSpPr>
               <p:cNvPr id="19459" name="Rectangle 6"/>
@@ -18227,7 +18152,6 @@
                   <a:rPr lang="en-US" altLang="en-US" dirty="0" smtClean="0"/>
                   <a:t>Difference of two proportions</a:t>
                 </a:r>
-                <a:endParaRPr lang="en-US" altLang="en-US" dirty="0" smtClean="0"/>
               </a:p>
               <a:p>
                 <a:pPr marL="0" indent="0">
@@ -18932,7 +18856,7 @@
             </p:txBody>
           </p:sp>
         </mc:Choice>
-        <mc:Fallback>
+        <mc:Fallback xmlns="">
           <p:sp>
             <p:nvSpPr>
               <p:cNvPr id="19459" name="Rectangle 6"/>
@@ -19020,18 +18944,13 @@
           <a:p>
             <a:r>
               <a:rPr lang="en-US" altLang="en-US" dirty="0" smtClean="0"/>
-              <a:t>Null and Alternative </a:t>
+              <a:t>Null and Alternative Hypotheses</a:t>
             </a:r>
-            <a:r>
-              <a:rPr lang="en-US" altLang="en-US" dirty="0" smtClean="0"/>
-              <a:t>Hypotheses</a:t>
-            </a:r>
-            <a:endParaRPr lang="en-US" altLang="en-US" dirty="0" smtClean="0"/>
           </a:p>
         </p:txBody>
       </p:sp>
-      <mc:AlternateContent xmlns:mc="http://schemas.openxmlformats.org/markup-compatibility/2006">
-        <mc:Choice xmlns:a14="http://schemas.microsoft.com/office/drawing/2010/main" Requires="a14">
+      <mc:AlternateContent xmlns:mc="http://schemas.openxmlformats.org/markup-compatibility/2006" xmlns:a14="http://schemas.microsoft.com/office/drawing/2010/main">
+        <mc:Choice Requires="a14">
           <p:sp>
             <p:nvSpPr>
               <p:cNvPr id="19459" name="Rectangle 6"/>
@@ -19317,7 +19236,7 @@
             </p:txBody>
           </p:sp>
         </mc:Choice>
-        <mc:Fallback>
+        <mc:Fallback xmlns="">
           <p:sp>
             <p:nvSpPr>
               <p:cNvPr id="19459" name="Rectangle 6"/>
@@ -19419,8 +19338,8 @@
           </a:p>
         </p:txBody>
       </p:sp>
-      <mc:AlternateContent xmlns:mc="http://schemas.openxmlformats.org/markup-compatibility/2006">
-        <mc:Choice xmlns:a14="http://schemas.microsoft.com/office/drawing/2010/main" Requires="a14">
+      <mc:AlternateContent xmlns:mc="http://schemas.openxmlformats.org/markup-compatibility/2006" xmlns:a14="http://schemas.microsoft.com/office/drawing/2010/main">
+        <mc:Choice Requires="a14">
           <p:sp>
             <p:nvSpPr>
               <p:cNvPr id="19459" name="Rectangle 6"/>
@@ -19501,7 +19420,6 @@
                   <a:rPr lang="en-US" altLang="en-US" dirty="0" smtClean="0"/>
                   <a:t>Use the pooled proportion to check the success-failure condition and the standard error.</a:t>
                 </a:r>
-                <a:endParaRPr lang="en-US" altLang="en-US" dirty="0" smtClean="0"/>
               </a:p>
               <a:p>
                 <a:endParaRPr lang="en-US" altLang="en-US" dirty="0" smtClean="0"/>
@@ -19509,11 +19427,7 @@
               <a:p>
                 <a:r>
                   <a:rPr lang="en-US" altLang="en-US" dirty="0" smtClean="0"/>
-                  <a:t>Test </a:t>
-                </a:r>
-                <a:r>
-                  <a:rPr lang="en-US" altLang="en-US" dirty="0" smtClean="0"/>
-                  <a:t>statistic </a:t>
+                  <a:t>Test statistic </a:t>
                 </a:r>
                 <a14:m>
                   <m:oMath xmlns:m="http://schemas.openxmlformats.org/officeDocument/2006/math">
@@ -20222,7 +20136,7 @@
             </p:txBody>
           </p:sp>
         </mc:Choice>
-        <mc:Fallback>
+        <mc:Fallback xmlns="">
           <p:sp>
             <p:nvSpPr>
               <p:cNvPr id="19459" name="Rectangle 6"/>

</xml_diff>